<commit_message>
Added a picture in the presentation.
</commit_message>
<xml_diff>
--- a/Vortrag/vortrag_dennis.pptx
+++ b/Vortrag/vortrag_dennis.pptx
@@ -296,7 +296,7 @@
       </p:grpSpPr>
       <p:sp>
         <p:nvSpPr>
-          <p:cNvPr id="58" name="Shape 58"/>
+          <p:cNvPr id="59" name="Shape 59"/>
           <p:cNvSpPr/>
           <p:nvPr>
             <p:ph type="sldImg"/>
@@ -317,7 +317,7 @@
       </p:sp>
       <p:sp>
         <p:nvSpPr>
-          <p:cNvPr id="59" name="Shape 59"/>
+          <p:cNvPr id="60" name="Shape 60"/>
           <p:cNvSpPr/>
           <p:nvPr>
             <p:ph type="body" sz="quarter" idx="1"/>
@@ -2069,7 +2069,7 @@
       </p:grpSpPr>
       <p:sp>
         <p:nvSpPr>
-          <p:cNvPr id="61" name="Shape 61"/>
+          <p:cNvPr id="62" name="Shape 62"/>
           <p:cNvSpPr/>
           <p:nvPr>
             <p:ph type="title"/>
@@ -2096,7 +2096,7 @@
       </p:sp>
       <p:sp>
         <p:nvSpPr>
-          <p:cNvPr id="62" name="Shape 62"/>
+          <p:cNvPr id="63" name="Shape 63"/>
           <p:cNvSpPr/>
           <p:nvPr>
             <p:ph type="body" idx="1"/>
@@ -2179,7 +2179,7 @@
       </p:grpSpPr>
       <p:sp>
         <p:nvSpPr>
-          <p:cNvPr id="64" name="Shape 64"/>
+          <p:cNvPr id="65" name="Shape 65"/>
           <p:cNvSpPr/>
           <p:nvPr>
             <p:ph type="title"/>
@@ -2206,7 +2206,7 @@
       </p:sp>
       <p:sp>
         <p:nvSpPr>
-          <p:cNvPr id="65" name="Shape 65"/>
+          <p:cNvPr id="66" name="Shape 66"/>
           <p:cNvSpPr/>
           <p:nvPr>
             <p:ph type="body" idx="1"/>
@@ -3094,6 +3094,10 @@
           </p:nvPr>
         </p:nvSpPr>
         <p:spPr>
+          <a:xfrm>
+            <a:off x="952499" y="2527074"/>
+            <a:ext cx="11099801" cy="1428299"/>
+          </a:xfrm>
           <a:prstGeom prst="rect">
             <a:avLst/>
           </a:prstGeom>
@@ -3122,6 +3126,33 @@
           </a:p>
         </p:txBody>
       </p:sp>
+      <p:pic>
+        <p:nvPicPr>
+          <p:cNvPr id="58" name="Bildschirmfoto 2014-12-17 um 19.59.34.png"/>
+          <p:cNvPicPr/>
+          <p:nvPr/>
+        </p:nvPicPr>
+        <p:blipFill>
+          <a:blip r:embed="rId3">
+            <a:extLst/>
+          </a:blip>
+          <a:stretch>
+            <a:fillRect/>
+          </a:stretch>
+        </p:blipFill>
+        <p:spPr>
+          <a:xfrm>
+            <a:off x="1509318" y="4192998"/>
+            <a:ext cx="9986164" cy="5094114"/>
+          </a:xfrm>
+          <a:prstGeom prst="rect">
+            <a:avLst/>
+          </a:prstGeom>
+          <a:ln w="12700">
+            <a:miter lim="400000"/>
+          </a:ln>
+        </p:spPr>
+      </p:pic>
     </p:spTree>
   </p:cSld>
   <p:clrMapOvr>

</xml_diff>